<commit_message>
Ajout du controle des saises des donnes + modification methode de developpement + modification du pptx
</commit_message>
<xml_diff>
--- a/Livrable2/Présentation_video_technique.pptx
+++ b/Livrable2/Présentation_video_technique.pptx
@@ -5,13 +5,14 @@
     <p:sldMasterId id="2147483648" r:id="rId1"/>
   </p:sldMasterIdLst>
   <p:notesMasterIdLst>
-    <p:notesMasterId r:id="rId6"/>
+    <p:notesMasterId r:id="rId7"/>
   </p:notesMasterIdLst>
   <p:sldIdLst>
     <p:sldId id="267" r:id="rId2"/>
     <p:sldId id="269" r:id="rId3"/>
     <p:sldId id="258" r:id="rId4"/>
-    <p:sldId id="271" r:id="rId5"/>
+    <p:sldId id="272" r:id="rId5"/>
+    <p:sldId id="271" r:id="rId6"/>
   </p:sldIdLst>
   <p:sldSz cx="12192000" cy="6858000"/>
   <p:notesSz cx="7559675" cy="10691813"/>
@@ -200,7 +201,7 @@
           <a:p>
             <a:fld id="{BF1E4C38-38C3-4C47-B9B7-EF45359A68DE}" type="datetimeFigureOut">
               <a:rPr lang="fr-FR" smtClean="0"/>
-              <a:t>06/06/2019</a:t>
+              <a:t>03/07/2019</a:t>
             </a:fld>
             <a:endParaRPr lang="fr-FR"/>
           </a:p>
@@ -625,6 +626,90 @@
     </p:spTree>
     <p:extLst>
       <p:ext uri="{BB962C8B-B14F-4D97-AF65-F5344CB8AC3E}">
+        <p14:creationId xmlns:p14="http://schemas.microsoft.com/office/powerpoint/2010/main" val="2777411253"/>
+      </p:ext>
+    </p:extLst>
+  </p:cSld>
+  <p:clrMapOvr>
+    <a:masterClrMapping/>
+  </p:clrMapOvr>
+</p:notes>
+</file>
+
+<file path=ppt/notesSlides/notesSlide3.xml><?xml version="1.0" encoding="utf-8"?>
+<p:notes xmlns:a="http://schemas.openxmlformats.org/drawingml/2006/main" xmlns:r="http://schemas.openxmlformats.org/officeDocument/2006/relationships" xmlns:p="http://schemas.openxmlformats.org/presentationml/2006/main">
+  <p:cSld>
+    <p:spTree>
+      <p:nvGrpSpPr>
+        <p:cNvPr id="1" name=""/>
+        <p:cNvGrpSpPr/>
+        <p:nvPr/>
+      </p:nvGrpSpPr>
+      <p:grpSpPr>
+        <a:xfrm>
+          <a:off x="0" y="0"/>
+          <a:ext cx="0" cy="0"/>
+          <a:chOff x="0" y="0"/>
+          <a:chExt cx="0" cy="0"/>
+        </a:xfrm>
+      </p:grpSpPr>
+      <p:sp>
+        <p:nvSpPr>
+          <p:cNvPr id="2" name="Espace réservé de l'image des diapositives 1"/>
+          <p:cNvSpPr>
+            <a:spLocks noGrp="1" noRot="1" noChangeAspect="1"/>
+          </p:cNvSpPr>
+          <p:nvPr>
+            <p:ph type="sldImg"/>
+          </p:nvPr>
+        </p:nvSpPr>
+        <p:spPr/>
+      </p:sp>
+      <p:sp>
+        <p:nvSpPr>
+          <p:cNvPr id="3" name="Espace réservé des notes 2"/>
+          <p:cNvSpPr>
+            <a:spLocks noGrp="1"/>
+          </p:cNvSpPr>
+          <p:nvPr>
+            <p:ph type="body" idx="1"/>
+          </p:nvPr>
+        </p:nvSpPr>
+        <p:spPr/>
+        <p:txBody>
+          <a:bodyPr/>
+          <a:lstStyle/>
+          <a:p>
+            <a:endParaRPr lang="fr-FR" dirty="0"/>
+          </a:p>
+        </p:txBody>
+      </p:sp>
+      <p:sp>
+        <p:nvSpPr>
+          <p:cNvPr id="4" name="Espace réservé du numéro de diapositive 3"/>
+          <p:cNvSpPr>
+            <a:spLocks noGrp="1"/>
+          </p:cNvSpPr>
+          <p:nvPr>
+            <p:ph type="sldNum" sz="quarter" idx="5"/>
+          </p:nvPr>
+        </p:nvSpPr>
+        <p:spPr/>
+        <p:txBody>
+          <a:bodyPr/>
+          <a:lstStyle/>
+          <a:p>
+            <a:fld id="{4C7EF9AC-3BAF-43D8-A225-8BB59E7B2206}" type="slidenum">
+              <a:rPr lang="fr-FR" smtClean="0"/>
+              <a:t>5</a:t>
+            </a:fld>
+            <a:endParaRPr lang="fr-FR"/>
+          </a:p>
+        </p:txBody>
+      </p:sp>
+    </p:spTree>
+    <p:extLst>
+      <p:ext uri="{BB962C8B-B14F-4D97-AF65-F5344CB8AC3E}">
         <p14:creationId xmlns:p14="http://schemas.microsoft.com/office/powerpoint/2010/main" val="2483412090"/>
       </p:ext>
     </p:extLst>
@@ -1370,7 +1455,7 @@
           <a:p>
             <a:fld id="{638941B0-F4D5-4460-BCAD-F7E2B41A8257}" type="datetimeFigureOut">
               <a:rPr lang="de-DE" smtClean="0"/>
-              <a:t>06.06.2019</a:t>
+              <a:t>03.07.2019</a:t>
             </a:fld>
             <a:endParaRPr lang="de-DE"/>
           </a:p>
@@ -2429,7 +2514,7 @@
                 </a:solidFill>
                 <a:latin typeface="Calibri"/>
               </a:rPr>
-              <a:t>06/06/2019</a:t>
+              <a:t>03/07/2019</a:t>
             </a:fld>
             <a:endParaRPr lang="fr-FR" sz="1200" b="0" strike="noStrike" spc="-1">
               <a:latin typeface="Times New Roman"/>
@@ -3012,7 +3097,7 @@
           <p:cNvPr id="3" name="Picture 2" descr="C:\Users\Barna TM\Desktop\modeleblanc.png">
             <a:extLst>
               <a:ext uri="{FF2B5EF4-FFF2-40B4-BE49-F238E27FC236}">
-                <a16:creationId xmlns:a16="http://schemas.microsoft.com/office/drawing/2014/main" id="{5F80FDE5-8786-4899-BFE5-F7D5B3794032}"/>
+                <a16:creationId xmlns:a16="http://schemas.microsoft.com/office/drawing/2014/main" xmlns="" id="{5F80FDE5-8786-4899-BFE5-F7D5B3794032}"/>
               </a:ext>
             </a:extLst>
           </p:cNvPr>
@@ -3060,7 +3145,7 @@
           <p:cNvPr id="5" name="Freeform 47">
             <a:extLst>
               <a:ext uri="{FF2B5EF4-FFF2-40B4-BE49-F238E27FC236}">
-                <a16:creationId xmlns:a16="http://schemas.microsoft.com/office/drawing/2014/main" id="{F79E5E8E-1524-413E-9226-3150F760B9CF}"/>
+                <a16:creationId xmlns:a16="http://schemas.microsoft.com/office/drawing/2014/main" xmlns="" id="{F79E5E8E-1524-413E-9226-3150F760B9CF}"/>
               </a:ext>
             </a:extLst>
           </p:cNvPr>
@@ -3166,7 +3251,7 @@
           <p:cNvPr id="6" name="Espace réservé pour une image  5">
             <a:extLst>
               <a:ext uri="{FF2B5EF4-FFF2-40B4-BE49-F238E27FC236}">
-                <a16:creationId xmlns:a16="http://schemas.microsoft.com/office/drawing/2014/main" id="{965F3CD8-BA2A-4FAA-8026-ED9CD0AFDC23}"/>
+                <a16:creationId xmlns:a16="http://schemas.microsoft.com/office/drawing/2014/main" xmlns="" id="{965F3CD8-BA2A-4FAA-8026-ED9CD0AFDC23}"/>
               </a:ext>
             </a:extLst>
           </p:cNvPr>
@@ -3314,7 +3399,7 @@
           <p:cNvPr id="7" name="Image 6">
             <a:extLst>
               <a:ext uri="{FF2B5EF4-FFF2-40B4-BE49-F238E27FC236}">
-                <a16:creationId xmlns:a16="http://schemas.microsoft.com/office/drawing/2014/main" id="{4C4E5DA9-B8C3-4F12-A3A5-EFA3D3550005}"/>
+                <a16:creationId xmlns:a16="http://schemas.microsoft.com/office/drawing/2014/main" xmlns="" id="{4C4E5DA9-B8C3-4F12-A3A5-EFA3D3550005}"/>
               </a:ext>
             </a:extLst>
           </p:cNvPr>
@@ -3350,7 +3435,7 @@
           <p:cNvPr id="12" name="Titre 1">
             <a:extLst>
               <a:ext uri="{FF2B5EF4-FFF2-40B4-BE49-F238E27FC236}">
-                <a16:creationId xmlns:a16="http://schemas.microsoft.com/office/drawing/2014/main" id="{4BFE6EFB-7191-4F07-9E16-78E2B9F86C15}"/>
+                <a16:creationId xmlns:a16="http://schemas.microsoft.com/office/drawing/2014/main" xmlns="" id="{4BFE6EFB-7191-4F07-9E16-78E2B9F86C15}"/>
               </a:ext>
             </a:extLst>
           </p:cNvPr>
@@ -3628,7 +3713,7 @@
           <p:cNvPr id="13" name="Sous-titre 2">
             <a:extLst>
               <a:ext uri="{FF2B5EF4-FFF2-40B4-BE49-F238E27FC236}">
-                <a16:creationId xmlns:a16="http://schemas.microsoft.com/office/drawing/2014/main" id="{037982B6-F1FF-42C3-B2F0-49D82FA9C762}"/>
+                <a16:creationId xmlns:a16="http://schemas.microsoft.com/office/drawing/2014/main" xmlns="" id="{037982B6-F1FF-42C3-B2F0-49D82FA9C762}"/>
               </a:ext>
             </a:extLst>
           </p:cNvPr>
@@ -3911,7 +3996,7 @@
           <p:cNvPr id="14" name="Sous-titre 2">
             <a:extLst>
               <a:ext uri="{FF2B5EF4-FFF2-40B4-BE49-F238E27FC236}">
-                <a16:creationId xmlns:a16="http://schemas.microsoft.com/office/drawing/2014/main" id="{A4F0BD8A-89E9-4CDD-88DF-C63E353B213D}"/>
+                <a16:creationId xmlns:a16="http://schemas.microsoft.com/office/drawing/2014/main" xmlns="" id="{A4F0BD8A-89E9-4CDD-88DF-C63E353B213D}"/>
               </a:ext>
             </a:extLst>
           </p:cNvPr>
@@ -4217,7 +4302,7 @@
           <p:cNvPr id="3" name="Picture 2" descr="C:\Users\Barna TM\Desktop\modeleblanc.png">
             <a:extLst>
               <a:ext uri="{FF2B5EF4-FFF2-40B4-BE49-F238E27FC236}">
-                <a16:creationId xmlns:a16="http://schemas.microsoft.com/office/drawing/2014/main" id="{5F80FDE5-8786-4899-BFE5-F7D5B3794032}"/>
+                <a16:creationId xmlns:a16="http://schemas.microsoft.com/office/drawing/2014/main" xmlns="" id="{5F80FDE5-8786-4899-BFE5-F7D5B3794032}"/>
               </a:ext>
             </a:extLst>
           </p:cNvPr>
@@ -4265,7 +4350,7 @@
           <p:cNvPr id="4" name="ZoneTexte 3">
             <a:extLst>
               <a:ext uri="{FF2B5EF4-FFF2-40B4-BE49-F238E27FC236}">
-                <a16:creationId xmlns:a16="http://schemas.microsoft.com/office/drawing/2014/main" id="{54869625-0C14-47DE-BC9D-8F057575CE91}"/>
+                <a16:creationId xmlns:a16="http://schemas.microsoft.com/office/drawing/2014/main" xmlns="" id="{54869625-0C14-47DE-BC9D-8F057575CE91}"/>
               </a:ext>
             </a:extLst>
           </p:cNvPr>
@@ -4304,7 +4389,7 @@
           <p:cNvPr id="5" name="ZoneTexte 4">
             <a:extLst>
               <a:ext uri="{FF2B5EF4-FFF2-40B4-BE49-F238E27FC236}">
-                <a16:creationId xmlns:a16="http://schemas.microsoft.com/office/drawing/2014/main" id="{12DBB929-FF2C-41C8-A667-B96554FE7878}"/>
+                <a16:creationId xmlns:a16="http://schemas.microsoft.com/office/drawing/2014/main" xmlns="" id="{12DBB929-FF2C-41C8-A667-B96554FE7878}"/>
               </a:ext>
             </a:extLst>
           </p:cNvPr>
@@ -4462,7 +4547,7 @@
           <p:cNvPr id="6" name="Freeform 47">
             <a:extLst>
               <a:ext uri="{FF2B5EF4-FFF2-40B4-BE49-F238E27FC236}">
-                <a16:creationId xmlns:a16="http://schemas.microsoft.com/office/drawing/2014/main" id="{B98A3ACA-F64B-4AE4-97AE-2E20BF16E634}"/>
+                <a16:creationId xmlns:a16="http://schemas.microsoft.com/office/drawing/2014/main" xmlns="" id="{B98A3ACA-F64B-4AE4-97AE-2E20BF16E634}"/>
               </a:ext>
             </a:extLst>
           </p:cNvPr>
@@ -4568,7 +4653,7 @@
           <p:cNvPr id="7" name="Espace réservé pour une image  5">
             <a:extLst>
               <a:ext uri="{FF2B5EF4-FFF2-40B4-BE49-F238E27FC236}">
-                <a16:creationId xmlns:a16="http://schemas.microsoft.com/office/drawing/2014/main" id="{633BBD46-A57F-4A89-BE7E-F17364BCC4D8}"/>
+                <a16:creationId xmlns:a16="http://schemas.microsoft.com/office/drawing/2014/main" xmlns="" id="{633BBD46-A57F-4A89-BE7E-F17364BCC4D8}"/>
               </a:ext>
             </a:extLst>
           </p:cNvPr>
@@ -5318,13 +5403,22 @@
               </a:lnSpc>
             </a:pPr>
             <a:r>
-              <a:rPr lang="fr-FR" sz="2800" b="1" strike="noStrike" spc="-1" dirty="0">
+              <a:rPr lang="fr-FR" sz="2800" b="1" spc="-1" dirty="0">
                 <a:solidFill>
                   <a:srgbClr val="FFFFFF"/>
                 </a:solidFill>
                 <a:latin typeface="Calibri"/>
               </a:rPr>
-              <a:t>1) Modèle de slide</a:t>
+              <a:t>3</a:t>
+            </a:r>
+            <a:r>
+              <a:rPr lang="fr-FR" sz="2800" b="1" strike="noStrike" spc="-1" dirty="0" smtClean="0">
+                <a:solidFill>
+                  <a:srgbClr val="FFFFFF"/>
+                </a:solidFill>
+                <a:latin typeface="Calibri"/>
+              </a:rPr>
+              <a:t>) Contrôle et saisies/données</a:t>
             </a:r>
             <a:endParaRPr lang="fr-FR" sz="2800" b="0" strike="noStrike" spc="-1" dirty="0">
               <a:latin typeface="Arial"/>
@@ -5349,10 +5443,10 @@
       </p:grpSp>
       <p:sp>
         <p:nvSpPr>
-          <p:cNvPr id="16" name="ZoneTexte 15">
+          <p:cNvPr id="18" name="ZoneTexte 17">
             <a:extLst>
               <a:ext uri="{FF2B5EF4-FFF2-40B4-BE49-F238E27FC236}">
-                <a16:creationId xmlns:a16="http://schemas.microsoft.com/office/drawing/2014/main" id="{533E0AB4-F9A0-4F74-9EF4-E9A95CC4352E}"/>
+                <a16:creationId xmlns:a16="http://schemas.microsoft.com/office/drawing/2014/main" xmlns="" id="{35741FB4-30BE-4C87-B668-0A0910CBB124}"/>
               </a:ext>
             </a:extLst>
           </p:cNvPr>
@@ -5361,8 +5455,8 @@
         </p:nvSpPr>
         <p:spPr>
           <a:xfrm>
-            <a:off x="11092543" y="6393575"/>
-            <a:ext cx="903514" cy="400110"/>
+            <a:off x="316997" y="1359138"/>
+            <a:ext cx="5958675" cy="4739759"/>
           </a:xfrm>
           <a:prstGeom prst="rect">
             <a:avLst/>
@@ -5375,63 +5469,17 @@
           </a:bodyPr>
           <a:lstStyle/>
           <a:p>
-            <a:pPr algn="ctr"/>
             <a:r>
-              <a:rPr lang="fr-FR" sz="2000" b="1" dirty="0"/>
-              <a:t>x/X</a:t>
-            </a:r>
-          </a:p>
-        </p:txBody>
-      </p:sp>
-      <p:sp>
-        <p:nvSpPr>
-          <p:cNvPr id="18" name="ZoneTexte 17">
-            <a:extLst>
-              <a:ext uri="{FF2B5EF4-FFF2-40B4-BE49-F238E27FC236}">
-                <a16:creationId xmlns:a16="http://schemas.microsoft.com/office/drawing/2014/main" id="{35741FB4-30BE-4C87-B668-0A0910CBB124}"/>
-              </a:ext>
-            </a:extLst>
-          </p:cNvPr>
-          <p:cNvSpPr txBox="1"/>
-          <p:nvPr/>
-        </p:nvSpPr>
-        <p:spPr>
-          <a:xfrm>
-            <a:off x="365124" y="1099255"/>
-            <a:ext cx="7673975" cy="3046988"/>
-          </a:xfrm>
-          <a:prstGeom prst="rect">
-            <a:avLst/>
-          </a:prstGeom>
-          <a:noFill/>
-        </p:spPr>
-        <p:txBody>
-          <a:bodyPr wrap="square" rtlCol="0">
-            <a:spAutoFit/>
-          </a:bodyPr>
-          <a:lstStyle/>
-          <a:p>
-            <a:r>
-              <a:rPr lang="fr-FR" sz="2000" b="1" dirty="0">
+              <a:rPr lang="fr-FR" sz="2400" b="1" dirty="0" smtClean="0">
                 <a:solidFill>
                   <a:srgbClr val="C84B1B"/>
                 </a:solidFill>
                 <a:latin typeface="Calibri" panose="020F0502020204030204" pitchFamily="34" charset="0"/>
                 <a:cs typeface="Calibri" panose="020F0502020204030204" pitchFamily="34" charset="0"/>
               </a:rPr>
-              <a:t>La structure des équipes du projet </a:t>
+              <a:t>Contrôles front-end :</a:t>
             </a:r>
-            <a:r>
-              <a:rPr lang="fr-FR" sz="2000" b="1" dirty="0" err="1">
-                <a:solidFill>
-                  <a:srgbClr val="C84B1B"/>
-                </a:solidFill>
-                <a:latin typeface="Calibri" panose="020F0502020204030204" pitchFamily="34" charset="0"/>
-                <a:cs typeface="Calibri" panose="020F0502020204030204" pitchFamily="34" charset="0"/>
-              </a:rPr>
-              <a:t>Madera</a:t>
-            </a:r>
-            <a:endParaRPr lang="fr-FR" sz="2000" dirty="0">
+            <a:endParaRPr lang="fr-FR" sz="2400" b="1" i="1" dirty="0">
               <a:solidFill>
                 <a:srgbClr val="000000"/>
               </a:solidFill>
@@ -5440,69 +5488,17 @@
             </a:endParaRPr>
           </a:p>
           <a:p>
-            <a:endParaRPr lang="fr-FR" sz="2000" dirty="0">
-              <a:solidFill>
-                <a:srgbClr val="000000"/>
-              </a:solidFill>
-              <a:latin typeface="Calibri" panose="020F0502020204030204" pitchFamily="34" charset="0"/>
-              <a:cs typeface="Calibri" panose="020F0502020204030204" pitchFamily="34" charset="0"/>
-            </a:endParaRPr>
-          </a:p>
-          <a:p>
-            <a:r>
-              <a:rPr lang="fr-FR" sz="2000" dirty="0">
-                <a:solidFill>
-                  <a:srgbClr val="000000"/>
-                </a:solidFill>
-                <a:latin typeface="Calibri" panose="020F0502020204030204" pitchFamily="34" charset="0"/>
-                <a:cs typeface="Calibri" panose="020F0502020204030204" pitchFamily="34" charset="0"/>
-              </a:rPr>
-              <a:t>Dans le projet </a:t>
-            </a:r>
-            <a:r>
-              <a:rPr lang="fr-FR" sz="2000" dirty="0" err="1">
-                <a:solidFill>
-                  <a:srgbClr val="000000"/>
-                </a:solidFill>
-                <a:latin typeface="Calibri" panose="020F0502020204030204" pitchFamily="34" charset="0"/>
-                <a:cs typeface="Calibri" panose="020F0502020204030204" pitchFamily="34" charset="0"/>
-              </a:rPr>
-              <a:t>Madera</a:t>
-            </a:r>
-            <a:r>
-              <a:rPr lang="fr-FR" sz="2000" dirty="0">
-                <a:solidFill>
-                  <a:srgbClr val="000000"/>
-                </a:solidFill>
-                <a:latin typeface="Calibri" panose="020F0502020204030204" pitchFamily="34" charset="0"/>
-                <a:cs typeface="Calibri" panose="020F0502020204030204" pitchFamily="34" charset="0"/>
-              </a:rPr>
-              <a:t> nous avons 3 postes distincts</a:t>
-            </a:r>
-          </a:p>
-          <a:p>
-            <a:endParaRPr lang="fr-FR" sz="2000" b="1" i="1" dirty="0">
-              <a:solidFill>
-                <a:srgbClr val="000000"/>
-              </a:solidFill>
-              <a:latin typeface="Calibri" panose="020F0502020204030204" pitchFamily="34" charset="0"/>
-              <a:cs typeface="Calibri" panose="020F0502020204030204" pitchFamily="34" charset="0"/>
-            </a:endParaRPr>
-          </a:p>
-          <a:p>
             <a:pPr marL="342900" indent="-342900">
               <a:buFontTx/>
               <a:buChar char="-"/>
             </a:pPr>
             <a:r>
-              <a:rPr lang="fr-FR" sz="2000" b="1" i="1" dirty="0">
+              <a:rPr lang="fr-FR" dirty="0" smtClean="0">
                 <a:solidFill>
                   <a:srgbClr val="000000"/>
                 </a:solidFill>
-                <a:latin typeface="Calibri" panose="020F0502020204030204" pitchFamily="34" charset="0"/>
-                <a:cs typeface="Calibri" panose="020F0502020204030204" pitchFamily="34" charset="0"/>
               </a:rPr>
-              <a:t>Chef de projet</a:t>
+              <a:t>Expression régulière</a:t>
             </a:r>
           </a:p>
           <a:p>
@@ -5511,14 +5507,12 @@
               <a:buChar char="-"/>
             </a:pPr>
             <a:r>
-              <a:rPr lang="fr-FR" sz="2000" b="1" i="1" dirty="0">
+              <a:rPr lang="fr-FR" dirty="0" smtClean="0">
                 <a:solidFill>
                   <a:srgbClr val="000000"/>
                 </a:solidFill>
-                <a:latin typeface="Calibri" panose="020F0502020204030204" pitchFamily="34" charset="0"/>
-                <a:cs typeface="Calibri" panose="020F0502020204030204" pitchFamily="34" charset="0"/>
               </a:rPr>
-              <a:t>Responsable technique</a:t>
+              <a:t>Pattern HTML</a:t>
             </a:r>
           </a:p>
           <a:p>
@@ -5527,18 +5521,94 @@
               <a:buChar char="-"/>
             </a:pPr>
             <a:r>
-              <a:rPr lang="fr-FR" sz="2000" b="1" i="1" dirty="0">
+              <a:rPr lang="fr-FR" dirty="0" smtClean="0">
                 <a:solidFill>
                   <a:srgbClr val="000000"/>
                 </a:solidFill>
-                <a:latin typeface="Calibri" panose="020F0502020204030204" pitchFamily="34" charset="0"/>
-                <a:cs typeface="Calibri" panose="020F0502020204030204" pitchFamily="34" charset="0"/>
               </a:rPr>
-              <a:t>Développeur</a:t>
+              <a:t>Type du champ</a:t>
             </a:r>
           </a:p>
           <a:p>
-            <a:endParaRPr lang="fr-FR" sz="2000" b="1" i="1" dirty="0">
+            <a:pPr marL="342900" indent="-342900">
+              <a:buFontTx/>
+              <a:buChar char="-"/>
+            </a:pPr>
+            <a:endParaRPr lang="fr-FR" dirty="0">
+              <a:solidFill>
+                <a:srgbClr val="000000"/>
+              </a:solidFill>
+            </a:endParaRPr>
+          </a:p>
+          <a:p>
+            <a:endParaRPr lang="fr-FR" sz="2400" b="1" dirty="0" smtClean="0">
+              <a:solidFill>
+                <a:srgbClr val="C84B1B"/>
+              </a:solidFill>
+              <a:latin typeface="Calibri" panose="020F0502020204030204" pitchFamily="34" charset="0"/>
+              <a:cs typeface="Calibri" panose="020F0502020204030204" pitchFamily="34" charset="0"/>
+            </a:endParaRPr>
+          </a:p>
+          <a:p>
+            <a:endParaRPr lang="fr-FR" sz="2400" b="1" dirty="0" smtClean="0">
+              <a:solidFill>
+                <a:srgbClr val="C84B1B"/>
+              </a:solidFill>
+              <a:latin typeface="Calibri" panose="020F0502020204030204" pitchFamily="34" charset="0"/>
+              <a:cs typeface="Calibri" panose="020F0502020204030204" pitchFamily="34" charset="0"/>
+            </a:endParaRPr>
+          </a:p>
+          <a:p>
+            <a:endParaRPr lang="fr-FR" sz="2400" b="1" dirty="0">
+              <a:solidFill>
+                <a:srgbClr val="C84B1B"/>
+              </a:solidFill>
+              <a:latin typeface="Calibri" panose="020F0502020204030204" pitchFamily="34" charset="0"/>
+              <a:cs typeface="Calibri" panose="020F0502020204030204" pitchFamily="34" charset="0"/>
+            </a:endParaRPr>
+          </a:p>
+          <a:p>
+            <a:endParaRPr lang="fr-FR" sz="2400" b="1" dirty="0" smtClean="0">
+              <a:solidFill>
+                <a:srgbClr val="C84B1B"/>
+              </a:solidFill>
+              <a:latin typeface="Calibri" panose="020F0502020204030204" pitchFamily="34" charset="0"/>
+              <a:cs typeface="Calibri" panose="020F0502020204030204" pitchFamily="34" charset="0"/>
+            </a:endParaRPr>
+          </a:p>
+          <a:p>
+            <a:endParaRPr lang="fr-FR" sz="2400" b="1" dirty="0">
+              <a:solidFill>
+                <a:srgbClr val="C84B1B"/>
+              </a:solidFill>
+              <a:latin typeface="Calibri" panose="020F0502020204030204" pitchFamily="34" charset="0"/>
+              <a:cs typeface="Calibri" panose="020F0502020204030204" pitchFamily="34" charset="0"/>
+            </a:endParaRPr>
+          </a:p>
+          <a:p>
+            <a:pPr marL="342900" indent="-342900">
+              <a:buFontTx/>
+              <a:buChar char="-"/>
+            </a:pPr>
+            <a:endParaRPr lang="fr-FR" dirty="0">
+              <a:solidFill>
+                <a:srgbClr val="000000"/>
+              </a:solidFill>
+            </a:endParaRPr>
+          </a:p>
+          <a:p>
+            <a:pPr marL="342900" indent="-342900">
+              <a:buFontTx/>
+              <a:buChar char="-"/>
+            </a:pPr>
+            <a:endParaRPr lang="fr-FR" dirty="0" smtClean="0">
+              <a:solidFill>
+                <a:srgbClr val="000000"/>
+              </a:solidFill>
+            </a:endParaRPr>
+          </a:p>
+          <a:p>
+            <a:endParaRPr lang="fr-FR" dirty="0">
               <a:solidFill>
                 <a:srgbClr val="000000"/>
               </a:solidFill>
@@ -5560,6 +5630,109 @@
               </a:rPr>
               <a:t>	</a:t>
             </a:r>
+          </a:p>
+        </p:txBody>
+      </p:sp>
+      <p:pic>
+        <p:nvPicPr>
+          <p:cNvPr id="2" name="Image 1"/>
+          <p:cNvPicPr>
+            <a:picLocks noChangeAspect="1"/>
+          </p:cNvPicPr>
+          <p:nvPr/>
+        </p:nvPicPr>
+        <p:blipFill>
+          <a:blip r:embed="rId4">
+            <a:extLst>
+              <a:ext uri="{28A0092B-C50C-407E-A947-70E740481C1C}">
+                <a14:useLocalDpi xmlns:a14="http://schemas.microsoft.com/office/drawing/2010/main" val="0"/>
+              </a:ext>
+            </a:extLst>
+          </a:blip>
+          <a:stretch>
+            <a:fillRect/>
+          </a:stretch>
+        </p:blipFill>
+        <p:spPr>
+          <a:xfrm>
+            <a:off x="2390273" y="3389034"/>
+            <a:ext cx="6628597" cy="3468966"/>
+          </a:xfrm>
+          <a:prstGeom prst="rect">
+            <a:avLst/>
+          </a:prstGeom>
+        </p:spPr>
+      </p:pic>
+      <p:sp>
+        <p:nvSpPr>
+          <p:cNvPr id="4" name="ZoneTexte 3"/>
+          <p:cNvSpPr txBox="1"/>
+          <p:nvPr/>
+        </p:nvSpPr>
+        <p:spPr>
+          <a:xfrm>
+            <a:off x="6275672" y="1329316"/>
+            <a:ext cx="7129112" cy="1292662"/>
+          </a:xfrm>
+          <a:prstGeom prst="rect">
+            <a:avLst/>
+          </a:prstGeom>
+          <a:noFill/>
+        </p:spPr>
+        <p:txBody>
+          <a:bodyPr wrap="square" rtlCol="0">
+            <a:spAutoFit/>
+          </a:bodyPr>
+          <a:lstStyle/>
+          <a:p>
+            <a:r>
+              <a:rPr lang="fr-FR" sz="2400" b="1" dirty="0">
+                <a:solidFill>
+                  <a:srgbClr val="C84B1B"/>
+                </a:solidFill>
+                <a:latin typeface="Calibri" panose="020F0502020204030204" pitchFamily="34" charset="0"/>
+                <a:cs typeface="Calibri" panose="020F0502020204030204" pitchFamily="34" charset="0"/>
+              </a:rPr>
+              <a:t>Contrôles back-end:</a:t>
+            </a:r>
+            <a:endParaRPr lang="fr-FR" sz="2400" b="1" i="1" dirty="0">
+              <a:solidFill>
+                <a:srgbClr val="000000"/>
+              </a:solidFill>
+              <a:latin typeface="Calibri" panose="020F0502020204030204" pitchFamily="34" charset="0"/>
+              <a:cs typeface="Calibri" panose="020F0502020204030204" pitchFamily="34" charset="0"/>
+            </a:endParaRPr>
+          </a:p>
+          <a:p>
+            <a:pPr marL="342900" indent="-342900">
+              <a:buFontTx/>
+              <a:buChar char="-"/>
+            </a:pPr>
+            <a:r>
+              <a:rPr lang="fr-FR" dirty="0">
+                <a:solidFill>
+                  <a:srgbClr val="000000"/>
+                </a:solidFill>
+              </a:rPr>
+              <a:t>Expression régulière</a:t>
+            </a:r>
+          </a:p>
+          <a:p>
+            <a:pPr marL="342900" indent="-342900">
+              <a:buFontTx/>
+              <a:buChar char="-"/>
+            </a:pPr>
+            <a:r>
+              <a:rPr lang="fr-FR" dirty="0">
+                <a:solidFill>
+                  <a:srgbClr val="000000"/>
+                </a:solidFill>
+              </a:rPr>
+              <a:t>Contrôle de la données et gestion des erreurs</a:t>
+            </a:r>
+          </a:p>
+          <a:p>
+            <a:endParaRPr lang="fr-FR" dirty="0"/>
           </a:p>
         </p:txBody>
       </p:sp>
@@ -5649,8 +5822,8 @@
         </p:nvSpPr>
         <p:spPr>
           <a:xfrm>
-            <a:off x="80279" y="209880"/>
-            <a:ext cx="10019217" cy="516960"/>
+            <a:off x="80280" y="209880"/>
+            <a:ext cx="6515280" cy="516960"/>
           </a:xfrm>
           <a:prstGeom prst="rect">
             <a:avLst/>
@@ -5682,21 +5855,23 @@
               </a:lnSpc>
             </a:pPr>
             <a:r>
-              <a:rPr lang="fr-FR" sz="2800" b="1" spc="-1" dirty="0">
+              <a:rPr lang="fr-FR" sz="2800" b="1" spc="-1" dirty="0" smtClean="0">
                 <a:solidFill>
                   <a:srgbClr val="FFFFFF"/>
                 </a:solidFill>
                 <a:latin typeface="Calibri"/>
               </a:rPr>
-              <a:t>6) Définition de l’environnement de développement</a:t>
+              <a:t>7</a:t>
             </a:r>
-          </a:p>
-          <a:p>
-            <a:pPr>
-              <a:lnSpc>
-                <a:spcPct val="100000"/>
-              </a:lnSpc>
-            </a:pPr>
+            <a:r>
+              <a:rPr lang="fr-FR" sz="2800" b="1" strike="noStrike" spc="-1" dirty="0" smtClean="0">
+                <a:solidFill>
+                  <a:srgbClr val="FFFFFF"/>
+                </a:solidFill>
+                <a:latin typeface="Calibri"/>
+              </a:rPr>
+              <a:t>) Méthode de développement</a:t>
+            </a:r>
             <a:endParaRPr lang="fr-FR" sz="2800" b="0" strike="noStrike" spc="-1" dirty="0">
               <a:latin typeface="Arial"/>
             </a:endParaRPr>
@@ -5718,12 +5893,482 @@
           </a:xfrm>
         </p:grpSpPr>
       </p:grpSp>
+      <p:sp>
+        <p:nvSpPr>
+          <p:cNvPr id="18" name="ZoneTexte 17">
+            <a:extLst>
+              <a:ext uri="{FF2B5EF4-FFF2-40B4-BE49-F238E27FC236}">
+                <a16:creationId xmlns:a16="http://schemas.microsoft.com/office/drawing/2014/main" xmlns="" id="{35741FB4-30BE-4C87-B668-0A0910CBB124}"/>
+              </a:ext>
+            </a:extLst>
+          </p:cNvPr>
+          <p:cNvSpPr txBox="1"/>
+          <p:nvPr/>
+        </p:nvSpPr>
+        <p:spPr>
+          <a:xfrm>
+            <a:off x="316997" y="1359138"/>
+            <a:ext cx="5958675" cy="4739759"/>
+          </a:xfrm>
+          <a:prstGeom prst="rect">
+            <a:avLst/>
+          </a:prstGeom>
+          <a:noFill/>
+        </p:spPr>
+        <p:txBody>
+          <a:bodyPr wrap="square" rtlCol="0">
+            <a:spAutoFit/>
+          </a:bodyPr>
+          <a:lstStyle/>
+          <a:p>
+            <a:r>
+              <a:rPr lang="fr-FR" sz="2400" b="1" dirty="0" smtClean="0">
+                <a:solidFill>
+                  <a:srgbClr val="C84B1B"/>
+                </a:solidFill>
+                <a:latin typeface="Calibri" panose="020F0502020204030204" pitchFamily="34" charset="0"/>
+                <a:cs typeface="Calibri" panose="020F0502020204030204" pitchFamily="34" charset="0"/>
+              </a:rPr>
+              <a:t>Différente méthode de développement :</a:t>
+            </a:r>
+            <a:endParaRPr lang="fr-FR" dirty="0" smtClean="0">
+              <a:solidFill>
+                <a:srgbClr val="000000"/>
+              </a:solidFill>
+            </a:endParaRPr>
+          </a:p>
+          <a:p>
+            <a:pPr marL="342900" indent="-342900">
+              <a:buFontTx/>
+              <a:buChar char="-"/>
+            </a:pPr>
+            <a:r>
+              <a:rPr lang="fr-FR" dirty="0" smtClean="0">
+                <a:solidFill>
+                  <a:srgbClr val="000000"/>
+                </a:solidFill>
+              </a:rPr>
+              <a:t>Modèle en cascade</a:t>
+            </a:r>
+          </a:p>
+          <a:p>
+            <a:pPr marL="342900" indent="-342900">
+              <a:buFontTx/>
+              <a:buChar char="-"/>
+            </a:pPr>
+            <a:r>
+              <a:rPr lang="fr-FR" dirty="0" smtClean="0">
+                <a:solidFill>
+                  <a:srgbClr val="000000"/>
+                </a:solidFill>
+              </a:rPr>
+              <a:t>Modèle prototype</a:t>
+            </a:r>
+          </a:p>
+          <a:p>
+            <a:pPr marL="342900" indent="-342900">
+              <a:buFontTx/>
+              <a:buChar char="-"/>
+            </a:pPr>
+            <a:r>
+              <a:rPr lang="fr-FR" dirty="0" smtClean="0">
+                <a:solidFill>
+                  <a:srgbClr val="000000"/>
+                </a:solidFill>
+              </a:rPr>
+              <a:t>Modèle en spirale</a:t>
+            </a:r>
+          </a:p>
+          <a:p>
+            <a:pPr marL="342900" indent="-342900">
+              <a:buFontTx/>
+              <a:buChar char="-"/>
+            </a:pPr>
+            <a:r>
+              <a:rPr lang="fr-FR" dirty="0" smtClean="0">
+                <a:solidFill>
+                  <a:srgbClr val="000000"/>
+                </a:solidFill>
+              </a:rPr>
+              <a:t>Modèle Agile</a:t>
+            </a:r>
+          </a:p>
+          <a:p>
+            <a:endParaRPr lang="fr-FR" sz="2400" b="1" dirty="0" smtClean="0">
+              <a:solidFill>
+                <a:srgbClr val="C84B1B"/>
+              </a:solidFill>
+              <a:latin typeface="Calibri" panose="020F0502020204030204" pitchFamily="34" charset="0"/>
+              <a:cs typeface="Calibri" panose="020F0502020204030204" pitchFamily="34" charset="0"/>
+            </a:endParaRPr>
+          </a:p>
+          <a:p>
+            <a:endParaRPr lang="fr-FR" sz="2400" b="1" dirty="0" smtClean="0">
+              <a:solidFill>
+                <a:srgbClr val="C84B1B"/>
+              </a:solidFill>
+              <a:latin typeface="Calibri" panose="020F0502020204030204" pitchFamily="34" charset="0"/>
+              <a:cs typeface="Calibri" panose="020F0502020204030204" pitchFamily="34" charset="0"/>
+            </a:endParaRPr>
+          </a:p>
+          <a:p>
+            <a:endParaRPr lang="fr-FR" sz="2400" b="1" dirty="0">
+              <a:solidFill>
+                <a:srgbClr val="C84B1B"/>
+              </a:solidFill>
+              <a:latin typeface="Calibri" panose="020F0502020204030204" pitchFamily="34" charset="0"/>
+              <a:cs typeface="Calibri" panose="020F0502020204030204" pitchFamily="34" charset="0"/>
+            </a:endParaRPr>
+          </a:p>
+          <a:p>
+            <a:endParaRPr lang="fr-FR" sz="2400" b="1" dirty="0" smtClean="0">
+              <a:solidFill>
+                <a:srgbClr val="C84B1B"/>
+              </a:solidFill>
+              <a:latin typeface="Calibri" panose="020F0502020204030204" pitchFamily="34" charset="0"/>
+              <a:cs typeface="Calibri" panose="020F0502020204030204" pitchFamily="34" charset="0"/>
+            </a:endParaRPr>
+          </a:p>
+          <a:p>
+            <a:endParaRPr lang="fr-FR" sz="2400" b="1" dirty="0">
+              <a:solidFill>
+                <a:srgbClr val="C84B1B"/>
+              </a:solidFill>
+              <a:latin typeface="Calibri" panose="020F0502020204030204" pitchFamily="34" charset="0"/>
+              <a:cs typeface="Calibri" panose="020F0502020204030204" pitchFamily="34" charset="0"/>
+            </a:endParaRPr>
+          </a:p>
+          <a:p>
+            <a:pPr marL="342900" indent="-342900">
+              <a:buFontTx/>
+              <a:buChar char="-"/>
+            </a:pPr>
+            <a:endParaRPr lang="fr-FR" dirty="0">
+              <a:solidFill>
+                <a:srgbClr val="000000"/>
+              </a:solidFill>
+            </a:endParaRPr>
+          </a:p>
+          <a:p>
+            <a:pPr marL="342900" indent="-342900">
+              <a:buFontTx/>
+              <a:buChar char="-"/>
+            </a:pPr>
+            <a:endParaRPr lang="fr-FR" dirty="0" smtClean="0">
+              <a:solidFill>
+                <a:srgbClr val="000000"/>
+              </a:solidFill>
+            </a:endParaRPr>
+          </a:p>
+          <a:p>
+            <a:endParaRPr lang="fr-FR" dirty="0">
+              <a:solidFill>
+                <a:srgbClr val="000000"/>
+              </a:solidFill>
+            </a:endParaRPr>
+          </a:p>
+          <a:p>
+            <a:endParaRPr lang="fr-FR" sz="2000" i="1" dirty="0">
+              <a:solidFill>
+                <a:srgbClr val="000000"/>
+              </a:solidFill>
+            </a:endParaRPr>
+          </a:p>
+          <a:p>
+            <a:r>
+              <a:rPr lang="fr-FR" sz="1200" dirty="0">
+                <a:solidFill>
+                  <a:schemeClr val="bg1"/>
+                </a:solidFill>
+              </a:rPr>
+              <a:t>	</a:t>
+            </a:r>
+          </a:p>
+        </p:txBody>
+      </p:sp>
+      <p:pic>
+        <p:nvPicPr>
+          <p:cNvPr id="8" name="officeArt object"/>
+          <p:cNvPicPr/>
+          <p:nvPr/>
+        </p:nvPicPr>
+        <p:blipFill>
+          <a:blip r:embed="rId4">
+            <a:extLst/>
+          </a:blip>
+          <a:stretch>
+            <a:fillRect/>
+          </a:stretch>
+        </p:blipFill>
+        <p:spPr>
+          <a:xfrm>
+            <a:off x="4372677" y="2236589"/>
+            <a:ext cx="2555240" cy="1957705"/>
+          </a:xfrm>
+          <a:prstGeom prst="rect">
+            <a:avLst/>
+          </a:prstGeom>
+          <a:ln w="12700" cap="flat">
+            <a:noFill/>
+            <a:miter lim="400000"/>
+          </a:ln>
+          <a:effectLst/>
+        </p:spPr>
+      </p:pic>
+      <p:pic>
+        <p:nvPicPr>
+          <p:cNvPr id="9" name="officeArt object"/>
+          <p:cNvPicPr/>
+          <p:nvPr/>
+        </p:nvPicPr>
+        <p:blipFill>
+          <a:blip r:embed="rId5">
+            <a:extLst/>
+          </a:blip>
+          <a:stretch>
+            <a:fillRect/>
+          </a:stretch>
+        </p:blipFill>
+        <p:spPr>
+          <a:xfrm>
+            <a:off x="8334224" y="1738534"/>
+            <a:ext cx="3602355" cy="1990483"/>
+          </a:xfrm>
+          <a:prstGeom prst="rect">
+            <a:avLst/>
+          </a:prstGeom>
+          <a:ln w="12700" cap="flat">
+            <a:noFill/>
+            <a:miter lim="400000"/>
+          </a:ln>
+          <a:effectLst/>
+        </p:spPr>
+      </p:pic>
+      <p:pic>
+        <p:nvPicPr>
+          <p:cNvPr id="10" name="officeArt object"/>
+          <p:cNvPicPr/>
+          <p:nvPr/>
+        </p:nvPicPr>
+        <p:blipFill>
+          <a:blip r:embed="rId6">
+            <a:extLst/>
+          </a:blip>
+          <a:srcRect/>
+          <a:stretch>
+            <a:fillRect/>
+          </a:stretch>
+        </p:blipFill>
+        <p:spPr>
+          <a:xfrm>
+            <a:off x="891957" y="4183900"/>
+            <a:ext cx="2905760" cy="2422525"/>
+          </a:xfrm>
+          <a:prstGeom prst="rect">
+            <a:avLst/>
+          </a:prstGeom>
+          <a:ln w="12700" cap="flat">
+            <a:noFill/>
+            <a:miter lim="400000"/>
+          </a:ln>
+          <a:effectLst/>
+        </p:spPr>
+      </p:pic>
+      <p:pic>
+        <p:nvPicPr>
+          <p:cNvPr id="11" name="officeArt object"/>
+          <p:cNvPicPr/>
+          <p:nvPr/>
+        </p:nvPicPr>
+        <p:blipFill>
+          <a:blip r:embed="rId7">
+            <a:extLst/>
+          </a:blip>
+          <a:stretch>
+            <a:fillRect/>
+          </a:stretch>
+        </p:blipFill>
+        <p:spPr>
+          <a:xfrm>
+            <a:off x="5914201" y="4316834"/>
+            <a:ext cx="5163770" cy="2228632"/>
+          </a:xfrm>
+          <a:prstGeom prst="rect">
+            <a:avLst/>
+          </a:prstGeom>
+          <a:ln w="12700" cap="flat">
+            <a:noFill/>
+            <a:miter lim="400000"/>
+          </a:ln>
+          <a:effectLst/>
+        </p:spPr>
+      </p:pic>
+    </p:spTree>
+    <p:extLst>
+      <p:ext uri="{BB962C8B-B14F-4D97-AF65-F5344CB8AC3E}">
+        <p14:creationId xmlns:p14="http://schemas.microsoft.com/office/powerpoint/2010/main" val="4174422101"/>
+      </p:ext>
+    </p:extLst>
+  </p:cSld>
+  <p:clrMapOvr>
+    <a:masterClrMapping/>
+  </p:clrMapOvr>
+  <p:transition spd="slow">
+    <p:push dir="u"/>
+  </p:transition>
+  <p:timing>
+    <p:tnLst>
+      <p:par>
+        <p:cTn id="1" dur="indefinite" restart="never" nodeType="tmRoot">
+          <p:childTnLst>
+            <p:seq>
+              <p:cTn id="2" dur="indefinite" nodeType="mainSeq"/>
+              <p:prevCondLst>
+                <p:cond evt="onPrev" delay="0">
+                  <p:tgtEl>
+                    <p:sldTgt/>
+                  </p:tgtEl>
+                </p:cond>
+              </p:prevCondLst>
+              <p:nextCondLst>
+                <p:cond evt="onNext" delay="0">
+                  <p:tgtEl>
+                    <p:sldTgt/>
+                  </p:tgtEl>
+                </p:cond>
+              </p:nextCondLst>
+            </p:seq>
+          </p:childTnLst>
+        </p:cTn>
+      </p:par>
+    </p:tnLst>
+  </p:timing>
+</p:sld>
+</file>
+
+<file path=ppt/slides/slide5.xml><?xml version="1.0" encoding="utf-8"?>
+<p:sld xmlns:a="http://schemas.openxmlformats.org/drawingml/2006/main" xmlns:r="http://schemas.openxmlformats.org/officeDocument/2006/relationships" xmlns:p="http://schemas.openxmlformats.org/presentationml/2006/main">
+  <p:cSld>
+    <p:spTree>
+      <p:nvGrpSpPr>
+        <p:cNvPr id="1" name=""/>
+        <p:cNvGrpSpPr/>
+        <p:nvPr/>
+      </p:nvGrpSpPr>
+      <p:grpSpPr>
+        <a:xfrm>
+          <a:off x="0" y="0"/>
+          <a:ext cx="0" cy="0"/>
+          <a:chOff x="0" y="0"/>
+          <a:chExt cx="0" cy="0"/>
+        </a:xfrm>
+      </p:grpSpPr>
+      <p:pic>
+        <p:nvPicPr>
+          <p:cNvPr id="53" name="Picture 2"/>
+          <p:cNvPicPr/>
+          <p:nvPr/>
+        </p:nvPicPr>
+        <p:blipFill>
+          <a:blip r:embed="rId3"/>
+          <a:stretch/>
+        </p:blipFill>
+        <p:spPr>
+          <a:xfrm>
+            <a:off x="1020" y="-559325"/>
+            <a:ext cx="12189960" cy="7551360"/>
+          </a:xfrm>
+          <a:prstGeom prst="rect">
+            <a:avLst/>
+          </a:prstGeom>
+          <a:ln>
+            <a:noFill/>
+          </a:ln>
+        </p:spPr>
+      </p:pic>
+      <p:sp>
+        <p:nvSpPr>
+          <p:cNvPr id="54" name="CustomShape 1"/>
+          <p:cNvSpPr/>
+          <p:nvPr/>
+        </p:nvSpPr>
+        <p:spPr>
+          <a:xfrm>
+            <a:off x="80279" y="209880"/>
+            <a:ext cx="10019217" cy="516960"/>
+          </a:xfrm>
+          <a:prstGeom prst="rect">
+            <a:avLst/>
+          </a:prstGeom>
+          <a:noFill/>
+          <a:ln>
+            <a:noFill/>
+          </a:ln>
+        </p:spPr>
+        <p:style>
+          <a:lnRef idx="0">
+            <a:scrgbClr r="0" g="0" b="0"/>
+          </a:lnRef>
+          <a:fillRef idx="0">
+            <a:scrgbClr r="0" g="0" b="0"/>
+          </a:fillRef>
+          <a:effectRef idx="0">
+            <a:scrgbClr r="0" g="0" b="0"/>
+          </a:effectRef>
+          <a:fontRef idx="minor"/>
+        </p:style>
+        <p:txBody>
+          <a:bodyPr lIns="90000" tIns="45000" rIns="90000" bIns="45000"/>
+          <a:lstStyle/>
+          <a:p>
+            <a:pPr>
+              <a:lnSpc>
+                <a:spcPct val="100000"/>
+              </a:lnSpc>
+            </a:pPr>
+            <a:r>
+              <a:rPr lang="fr-FR" sz="2800" b="1" spc="-1" dirty="0">
+                <a:solidFill>
+                  <a:srgbClr val="FFFFFF"/>
+                </a:solidFill>
+                <a:latin typeface="Calibri"/>
+              </a:rPr>
+              <a:t>6) Définition de l’environnement de développement</a:t>
+            </a:r>
+          </a:p>
+          <a:p>
+            <a:pPr>
+              <a:lnSpc>
+                <a:spcPct val="100000"/>
+              </a:lnSpc>
+            </a:pPr>
+            <a:endParaRPr lang="fr-FR" sz="2800" b="0" strike="noStrike" spc="-1" dirty="0">
+              <a:latin typeface="Arial"/>
+            </a:endParaRPr>
+          </a:p>
+        </p:txBody>
+      </p:sp>
+      <p:grpSp>
+        <p:nvGrpSpPr>
+          <p:cNvPr id="65" name="Group 12"/>
+          <p:cNvGrpSpPr/>
+          <p:nvPr/>
+        </p:nvGrpSpPr>
+        <p:grpSpPr>
+          <a:xfrm>
+            <a:off x="0" y="0"/>
+            <a:ext cx="36000" cy="36000"/>
+            <a:chOff x="0" y="0"/>
+            <a:chExt cx="36000" cy="36000"/>
+          </a:xfrm>
+        </p:grpSpPr>
+      </p:grpSp>
       <p:pic>
         <p:nvPicPr>
           <p:cNvPr id="5" name="Image 4">
             <a:extLst>
               <a:ext uri="{FF2B5EF4-FFF2-40B4-BE49-F238E27FC236}">
-                <a16:creationId xmlns:a16="http://schemas.microsoft.com/office/drawing/2014/main" id="{E0648999-A82D-43B3-A660-934AEE58DD75}"/>
+                <a16:creationId xmlns:a16="http://schemas.microsoft.com/office/drawing/2014/main" xmlns="" id="{E0648999-A82D-43B3-A660-934AEE58DD75}"/>
               </a:ext>
             </a:extLst>
           </p:cNvPr>
@@ -5759,7 +6404,7 @@
           <p:cNvPr id="17" name="ZoneTexte 16">
             <a:extLst>
               <a:ext uri="{FF2B5EF4-FFF2-40B4-BE49-F238E27FC236}">
-                <a16:creationId xmlns:a16="http://schemas.microsoft.com/office/drawing/2014/main" id="{5E3B2BC2-FA79-47AA-B66D-918169503D58}"/>
+                <a16:creationId xmlns:a16="http://schemas.microsoft.com/office/drawing/2014/main" xmlns="" id="{5E3B2BC2-FA79-47AA-B66D-918169503D58}"/>
               </a:ext>
             </a:extLst>
           </p:cNvPr>
@@ -5795,7 +6440,7 @@
           <p:cNvPr id="9" name="Image 8" descr="Une image contenant texte, extérieur, signe&#10;&#10;Description générée automatiquement">
             <a:extLst>
               <a:ext uri="{FF2B5EF4-FFF2-40B4-BE49-F238E27FC236}">
-                <a16:creationId xmlns:a16="http://schemas.microsoft.com/office/drawing/2014/main" id="{130BA04A-8692-4674-9385-5367FBFE3FEE}"/>
+                <a16:creationId xmlns:a16="http://schemas.microsoft.com/office/drawing/2014/main" xmlns="" id="{130BA04A-8692-4674-9385-5367FBFE3FEE}"/>
               </a:ext>
             </a:extLst>
           </p:cNvPr>
@@ -5805,7 +6450,7 @@
           <p:nvPr/>
         </p:nvPicPr>
         <p:blipFill>
-          <a:blip r:embed="rId5">
+          <a:blip r:embed="rId5" cstate="print">
             <a:extLst>
               <a:ext uri="{28A0092B-C50C-407E-A947-70E740481C1C}">
                 <a14:useLocalDpi xmlns:a14="http://schemas.microsoft.com/office/drawing/2010/main" val="0"/>
@@ -5831,7 +6476,7 @@
           <p:cNvPr id="11" name="Image 10">
             <a:extLst>
               <a:ext uri="{FF2B5EF4-FFF2-40B4-BE49-F238E27FC236}">
-                <a16:creationId xmlns:a16="http://schemas.microsoft.com/office/drawing/2014/main" id="{515062EB-A5F2-4E3F-B776-B379AEE604DE}"/>
+                <a16:creationId xmlns:a16="http://schemas.microsoft.com/office/drawing/2014/main" xmlns="" id="{515062EB-A5F2-4E3F-B776-B379AEE604DE}"/>
               </a:ext>
             </a:extLst>
           </p:cNvPr>
@@ -5841,7 +6486,7 @@
           <p:nvPr/>
         </p:nvPicPr>
         <p:blipFill>
-          <a:blip r:embed="rId6">
+          <a:blip r:embed="rId6" cstate="print">
             <a:extLst>
               <a:ext uri="{28A0092B-C50C-407E-A947-70E740481C1C}">
                 <a14:useLocalDpi xmlns:a14="http://schemas.microsoft.com/office/drawing/2010/main" val="0"/>
@@ -5867,7 +6512,7 @@
           <p:cNvPr id="15" name="Image 14">
             <a:extLst>
               <a:ext uri="{FF2B5EF4-FFF2-40B4-BE49-F238E27FC236}">
-                <a16:creationId xmlns:a16="http://schemas.microsoft.com/office/drawing/2014/main" id="{B7D11AF5-9A4A-40A6-8399-4A26856367A5}"/>
+                <a16:creationId xmlns:a16="http://schemas.microsoft.com/office/drawing/2014/main" xmlns="" id="{B7D11AF5-9A4A-40A6-8399-4A26856367A5}"/>
               </a:ext>
             </a:extLst>
           </p:cNvPr>
@@ -5877,7 +6522,7 @@
           <p:nvPr/>
         </p:nvPicPr>
         <p:blipFill>
-          <a:blip r:embed="rId7">
+          <a:blip r:embed="rId7" cstate="print">
             <a:extLst>
               <a:ext uri="{28A0092B-C50C-407E-A947-70E740481C1C}">
                 <a14:useLocalDpi xmlns:a14="http://schemas.microsoft.com/office/drawing/2010/main" val="0"/>
@@ -5903,7 +6548,7 @@
           <p:cNvPr id="20" name="Image 19">
             <a:extLst>
               <a:ext uri="{FF2B5EF4-FFF2-40B4-BE49-F238E27FC236}">
-                <a16:creationId xmlns:a16="http://schemas.microsoft.com/office/drawing/2014/main" id="{3BF314D0-DE26-4A13-ABA5-1668C6997C82}"/>
+                <a16:creationId xmlns:a16="http://schemas.microsoft.com/office/drawing/2014/main" xmlns="" id="{3BF314D0-DE26-4A13-ABA5-1668C6997C82}"/>
               </a:ext>
             </a:extLst>
           </p:cNvPr>
@@ -5913,7 +6558,7 @@
           <p:nvPr/>
         </p:nvPicPr>
         <p:blipFill>
-          <a:blip r:embed="rId8">
+          <a:blip r:embed="rId8" cstate="print">
             <a:extLst>
               <a:ext uri="{28A0092B-C50C-407E-A947-70E740481C1C}">
                 <a14:useLocalDpi xmlns:a14="http://schemas.microsoft.com/office/drawing/2010/main" val="0"/>
@@ -5939,7 +6584,7 @@
           <p:cNvPr id="22" name="Image 21">
             <a:extLst>
               <a:ext uri="{FF2B5EF4-FFF2-40B4-BE49-F238E27FC236}">
-                <a16:creationId xmlns:a16="http://schemas.microsoft.com/office/drawing/2014/main" id="{5CD258FD-9340-42E7-952E-A66D99D6B4DF}"/>
+                <a16:creationId xmlns:a16="http://schemas.microsoft.com/office/drawing/2014/main" xmlns="" id="{5CD258FD-9340-42E7-952E-A66D99D6B4DF}"/>
               </a:ext>
             </a:extLst>
           </p:cNvPr>
@@ -5975,7 +6620,7 @@
           <p:cNvPr id="24" name="Image 23">
             <a:extLst>
               <a:ext uri="{FF2B5EF4-FFF2-40B4-BE49-F238E27FC236}">
-                <a16:creationId xmlns:a16="http://schemas.microsoft.com/office/drawing/2014/main" id="{5C43DCB5-5EC0-443D-A8DC-7F3AFDE3DB71}"/>
+                <a16:creationId xmlns:a16="http://schemas.microsoft.com/office/drawing/2014/main" xmlns="" id="{5C43DCB5-5EC0-443D-A8DC-7F3AFDE3DB71}"/>
               </a:ext>
             </a:extLst>
           </p:cNvPr>
@@ -5985,7 +6630,7 @@
           <p:nvPr/>
         </p:nvPicPr>
         <p:blipFill>
-          <a:blip r:embed="rId10">
+          <a:blip r:embed="rId10" cstate="print">
             <a:extLst>
               <a:ext uri="{28A0092B-C50C-407E-A947-70E740481C1C}">
                 <a14:useLocalDpi xmlns:a14="http://schemas.microsoft.com/office/drawing/2010/main" val="0"/>
@@ -6011,7 +6656,7 @@
           <p:cNvPr id="26" name="Image 25">
             <a:extLst>
               <a:ext uri="{FF2B5EF4-FFF2-40B4-BE49-F238E27FC236}">
-                <a16:creationId xmlns:a16="http://schemas.microsoft.com/office/drawing/2014/main" id="{C2A3FA72-5F89-46E5-95F0-852F9194A79E}"/>
+                <a16:creationId xmlns:a16="http://schemas.microsoft.com/office/drawing/2014/main" xmlns="" id="{C2A3FA72-5F89-46E5-95F0-852F9194A79E}"/>
               </a:ext>
             </a:extLst>
           </p:cNvPr>
@@ -6021,7 +6666,7 @@
           <p:nvPr/>
         </p:nvPicPr>
         <p:blipFill>
-          <a:blip r:embed="rId11">
+          <a:blip r:embed="rId11" cstate="print">
             <a:extLst>
               <a:ext uri="{28A0092B-C50C-407E-A947-70E740481C1C}">
                 <a14:useLocalDpi xmlns:a14="http://schemas.microsoft.com/office/drawing/2010/main" val="0"/>

</xml_diff>